<commit_message>
Updated lecture 5, dynamical systems
</commit_message>
<xml_diff>
--- a/Lecture_5-Dynamical-Systems/Dynamical-Systems.pptx
+++ b/Lecture_5-Dynamical-Systems/Dynamical-Systems.pptx
@@ -5,10 +5,10 @@
     <p:sldMasterId id="2147483648" r:id="rId1"/>
   </p:sldMasterIdLst>
   <p:notesMasterIdLst>
-    <p:notesMasterId r:id="rId20"/>
+    <p:notesMasterId r:id="rId21"/>
   </p:notesMasterIdLst>
   <p:handoutMasterIdLst>
-    <p:handoutMasterId r:id="rId21"/>
+    <p:handoutMasterId r:id="rId22"/>
   </p:handoutMasterIdLst>
   <p:sldIdLst>
     <p:sldId id="256" r:id="rId2"/>
@@ -22,13 +22,14 @@
     <p:sldId id="492" r:id="rId10"/>
     <p:sldId id="493" r:id="rId11"/>
     <p:sldId id="497" r:id="rId12"/>
-    <p:sldId id="489" r:id="rId13"/>
-    <p:sldId id="494" r:id="rId14"/>
-    <p:sldId id="476" r:id="rId15"/>
-    <p:sldId id="462" r:id="rId16"/>
-    <p:sldId id="495" r:id="rId17"/>
-    <p:sldId id="498" r:id="rId18"/>
-    <p:sldId id="496" r:id="rId19"/>
+    <p:sldId id="499" r:id="rId13"/>
+    <p:sldId id="489" r:id="rId14"/>
+    <p:sldId id="494" r:id="rId15"/>
+    <p:sldId id="476" r:id="rId16"/>
+    <p:sldId id="462" r:id="rId17"/>
+    <p:sldId id="495" r:id="rId18"/>
+    <p:sldId id="498" r:id="rId19"/>
+    <p:sldId id="496" r:id="rId20"/>
   </p:sldIdLst>
   <p:sldSz cx="9144000" cy="6858000" type="screen4x3"/>
   <p:notesSz cx="6858000" cy="9144000"/>
@@ -1340,7 +1341,7 @@
               <a:pPr>
                 <a:defRPr/>
               </a:pPr>
-              <a:t>16</a:t>
+              <a:t>17</a:t>
             </a:fld>
             <a:endParaRPr lang="en-US" altLang="x-none"/>
           </a:p>
@@ -1433,7 +1434,7 @@
               <a:pPr>
                 <a:defRPr/>
               </a:pPr>
-              <a:t>17</a:t>
+              <a:t>18</a:t>
             </a:fld>
             <a:endParaRPr lang="en-US" altLang="x-none"/>
           </a:p>
@@ -1530,7 +1531,7 @@
               <a:pPr>
                 <a:defRPr/>
               </a:pPr>
-              <a:t>18</a:t>
+              <a:t>19</a:t>
             </a:fld>
             <a:endParaRPr lang="en-US" altLang="x-none"/>
           </a:p>
@@ -7812,6 +7813,1814 @@
           <p:cNvPr id="2" name="Title 1">
             <a:extLst>
               <a:ext uri="{FF2B5EF4-FFF2-40B4-BE49-F238E27FC236}">
+                <a16:creationId xmlns:a16="http://schemas.microsoft.com/office/drawing/2014/main" id="{C4E14F7C-F55D-1346-9362-CF86B3E41802}"/>
+              </a:ext>
+            </a:extLst>
+          </p:cNvPr>
+          <p:cNvSpPr>
+            <a:spLocks noGrp="1"/>
+          </p:cNvSpPr>
+          <p:nvPr>
+            <p:ph type="title"/>
+          </p:nvPr>
+        </p:nvSpPr>
+        <p:spPr/>
+        <p:txBody>
+          <a:bodyPr/>
+          <a:lstStyle/>
+          <a:p>
+            <a:r>
+              <a:rPr lang="en-US" dirty="0"/>
+              <a:t>How Eigenvectors Determine Trajectory</a:t>
+            </a:r>
+          </a:p>
+        </p:txBody>
+      </p:sp>
+      <p:sp>
+        <p:nvSpPr>
+          <p:cNvPr id="3" name="Slide Number Placeholder 2">
+            <a:extLst>
+              <a:ext uri="{FF2B5EF4-FFF2-40B4-BE49-F238E27FC236}">
+                <a16:creationId xmlns:a16="http://schemas.microsoft.com/office/drawing/2014/main" id="{606B6453-8D6C-CB4D-8ABA-D054172A78DA}"/>
+              </a:ext>
+            </a:extLst>
+          </p:cNvPr>
+          <p:cNvSpPr>
+            <a:spLocks noGrp="1"/>
+          </p:cNvSpPr>
+          <p:nvPr>
+            <p:ph type="sldNum" sz="quarter" idx="11"/>
+          </p:nvPr>
+        </p:nvSpPr>
+        <p:spPr/>
+        <p:txBody>
+          <a:bodyPr/>
+          <a:lstStyle/>
+          <a:p>
+            <a:pPr>
+              <a:defRPr/>
+            </a:pPr>
+            <a:fld id="{2E4304A7-0FB2-4094-BC1E-DB17183AD0C1}" type="slidenum">
+              <a:rPr lang="en-US" altLang="x-none" smtClean="0"/>
+              <a:pPr>
+                <a:defRPr/>
+              </a:pPr>
+              <a:t>12</a:t>
+            </a:fld>
+            <a:endParaRPr lang="en-US" altLang="x-none"/>
+          </a:p>
+        </p:txBody>
+      </p:sp>
+      <p:sp>
+        <p:nvSpPr>
+          <p:cNvPr id="4" name="Oval 3">
+            <a:extLst>
+              <a:ext uri="{FF2B5EF4-FFF2-40B4-BE49-F238E27FC236}">
+                <a16:creationId xmlns:a16="http://schemas.microsoft.com/office/drawing/2014/main" id="{2D1C7067-9AA8-D944-8A73-7157605FABA9}"/>
+              </a:ext>
+            </a:extLst>
+          </p:cNvPr>
+          <p:cNvSpPr/>
+          <p:nvPr/>
+        </p:nvSpPr>
+        <p:spPr>
+          <a:xfrm>
+            <a:off x="736846" y="1287262"/>
+            <a:ext cx="550416" cy="550415"/>
+          </a:xfrm>
+          <a:prstGeom prst="ellipse">
+            <a:avLst/>
+          </a:prstGeom>
+        </p:spPr>
+        <p:style>
+          <a:lnRef idx="1">
+            <a:schemeClr val="accent1"/>
+          </a:lnRef>
+          <a:fillRef idx="3">
+            <a:schemeClr val="accent1"/>
+          </a:fillRef>
+          <a:effectRef idx="2">
+            <a:schemeClr val="accent1"/>
+          </a:effectRef>
+          <a:fontRef idx="minor">
+            <a:schemeClr val="lt1"/>
+          </a:fontRef>
+        </p:style>
+        <p:txBody>
+          <a:bodyPr rtlCol="0" anchor="ctr"/>
+          <a:lstStyle/>
+          <a:p>
+            <a:pPr algn="ctr"/>
+            <a:r>
+              <a:rPr lang="en-US" sz="1600" dirty="0"/>
+              <a:t>S1</a:t>
+            </a:r>
+          </a:p>
+        </p:txBody>
+      </p:sp>
+      <p:sp>
+        <p:nvSpPr>
+          <p:cNvPr id="5" name="Oval 4">
+            <a:extLst>
+              <a:ext uri="{FF2B5EF4-FFF2-40B4-BE49-F238E27FC236}">
+                <a16:creationId xmlns:a16="http://schemas.microsoft.com/office/drawing/2014/main" id="{63506BEE-E39C-014A-AEC5-0A0110A966CF}"/>
+              </a:ext>
+            </a:extLst>
+          </p:cNvPr>
+          <p:cNvSpPr/>
+          <p:nvPr/>
+        </p:nvSpPr>
+        <p:spPr>
+          <a:xfrm>
+            <a:off x="1777013" y="1287261"/>
+            <a:ext cx="550416" cy="550415"/>
+          </a:xfrm>
+          <a:prstGeom prst="ellipse">
+            <a:avLst/>
+          </a:prstGeom>
+        </p:spPr>
+        <p:style>
+          <a:lnRef idx="1">
+            <a:schemeClr val="accent1"/>
+          </a:lnRef>
+          <a:fillRef idx="3">
+            <a:schemeClr val="accent1"/>
+          </a:fillRef>
+          <a:effectRef idx="2">
+            <a:schemeClr val="accent1"/>
+          </a:effectRef>
+          <a:fontRef idx="minor">
+            <a:schemeClr val="lt1"/>
+          </a:fontRef>
+        </p:style>
+        <p:txBody>
+          <a:bodyPr rtlCol="0" anchor="ctr"/>
+          <a:lstStyle/>
+          <a:p>
+            <a:pPr algn="ctr"/>
+            <a:r>
+              <a:rPr lang="en-US" sz="1600" dirty="0"/>
+              <a:t>S2</a:t>
+            </a:r>
+          </a:p>
+        </p:txBody>
+      </p:sp>
+      <p:sp>
+        <p:nvSpPr>
+          <p:cNvPr id="6" name="Oval 5">
+            <a:extLst>
+              <a:ext uri="{FF2B5EF4-FFF2-40B4-BE49-F238E27FC236}">
+                <a16:creationId xmlns:a16="http://schemas.microsoft.com/office/drawing/2014/main" id="{CC085A2C-2B70-5D47-8579-B7DAFEFE9923}"/>
+              </a:ext>
+            </a:extLst>
+          </p:cNvPr>
+          <p:cNvSpPr/>
+          <p:nvPr/>
+        </p:nvSpPr>
+        <p:spPr>
+          <a:xfrm>
+            <a:off x="2799422" y="1287261"/>
+            <a:ext cx="550416" cy="550415"/>
+          </a:xfrm>
+          <a:prstGeom prst="ellipse">
+            <a:avLst/>
+          </a:prstGeom>
+        </p:spPr>
+        <p:style>
+          <a:lnRef idx="1">
+            <a:schemeClr val="accent1"/>
+          </a:lnRef>
+          <a:fillRef idx="3">
+            <a:schemeClr val="accent1"/>
+          </a:fillRef>
+          <a:effectRef idx="2">
+            <a:schemeClr val="accent1"/>
+          </a:effectRef>
+          <a:fontRef idx="minor">
+            <a:schemeClr val="lt1"/>
+          </a:fontRef>
+        </p:style>
+        <p:txBody>
+          <a:bodyPr rtlCol="0" anchor="ctr"/>
+          <a:lstStyle/>
+          <a:p>
+            <a:pPr algn="ctr"/>
+            <a:r>
+              <a:rPr lang="en-US" sz="1600" dirty="0"/>
+              <a:t>S3</a:t>
+            </a:r>
+          </a:p>
+        </p:txBody>
+      </p:sp>
+      <p:cxnSp>
+        <p:nvCxnSpPr>
+          <p:cNvPr id="8" name="Straight Arrow Connector 7">
+            <a:extLst>
+              <a:ext uri="{FF2B5EF4-FFF2-40B4-BE49-F238E27FC236}">
+                <a16:creationId xmlns:a16="http://schemas.microsoft.com/office/drawing/2014/main" id="{6F884278-C627-C94A-9A65-2EF7B97D4891}"/>
+              </a:ext>
+            </a:extLst>
+          </p:cNvPr>
+          <p:cNvCxnSpPr>
+            <a:stCxn id="4" idx="6"/>
+            <a:endCxn id="5" idx="2"/>
+          </p:cNvCxnSpPr>
+          <p:nvPr/>
+        </p:nvCxnSpPr>
+        <p:spPr>
+          <a:xfrm flipV="1">
+            <a:off x="1287262" y="1562469"/>
+            <a:ext cx="489751" cy="1"/>
+          </a:xfrm>
+          <a:prstGeom prst="straightConnector1">
+            <a:avLst/>
+          </a:prstGeom>
+          <a:ln>
+            <a:tailEnd type="triangle"/>
+          </a:ln>
+        </p:spPr>
+        <p:style>
+          <a:lnRef idx="2">
+            <a:schemeClr val="accent1"/>
+          </a:lnRef>
+          <a:fillRef idx="0">
+            <a:schemeClr val="accent1"/>
+          </a:fillRef>
+          <a:effectRef idx="1">
+            <a:schemeClr val="accent1"/>
+          </a:effectRef>
+          <a:fontRef idx="minor">
+            <a:schemeClr val="tx1"/>
+          </a:fontRef>
+        </p:style>
+      </p:cxnSp>
+      <p:cxnSp>
+        <p:nvCxnSpPr>
+          <p:cNvPr id="10" name="Straight Arrow Connector 9">
+            <a:extLst>
+              <a:ext uri="{FF2B5EF4-FFF2-40B4-BE49-F238E27FC236}">
+                <a16:creationId xmlns:a16="http://schemas.microsoft.com/office/drawing/2014/main" id="{1ABE3F0E-2638-844D-B134-FA99FD75D3E4}"/>
+              </a:ext>
+            </a:extLst>
+          </p:cNvPr>
+          <p:cNvCxnSpPr>
+            <a:stCxn id="5" idx="6"/>
+            <a:endCxn id="6" idx="2"/>
+          </p:cNvCxnSpPr>
+          <p:nvPr/>
+        </p:nvCxnSpPr>
+        <p:spPr>
+          <a:xfrm>
+            <a:off x="2327429" y="1562469"/>
+            <a:ext cx="471993" cy="0"/>
+          </a:xfrm>
+          <a:prstGeom prst="straightConnector1">
+            <a:avLst/>
+          </a:prstGeom>
+          <a:ln>
+            <a:tailEnd type="triangle"/>
+          </a:ln>
+        </p:spPr>
+        <p:style>
+          <a:lnRef idx="2">
+            <a:schemeClr val="accent1"/>
+          </a:lnRef>
+          <a:fillRef idx="0">
+            <a:schemeClr val="accent1"/>
+          </a:fillRef>
+          <a:effectRef idx="1">
+            <a:schemeClr val="accent1"/>
+          </a:effectRef>
+          <a:fontRef idx="minor">
+            <a:schemeClr val="tx1"/>
+          </a:fontRef>
+        </p:style>
+      </p:cxnSp>
+      <mc:AlternateContent xmlns:mc="http://schemas.openxmlformats.org/markup-compatibility/2006">
+        <mc:Choice xmlns:a14="http://schemas.microsoft.com/office/drawing/2010/main" Requires="a14">
+          <p:sp>
+            <p:nvSpPr>
+              <p:cNvPr id="11" name="TextBox 10">
+                <a:extLst>
+                  <a:ext uri="{FF2B5EF4-FFF2-40B4-BE49-F238E27FC236}">
+                    <a16:creationId xmlns:a16="http://schemas.microsoft.com/office/drawing/2014/main" id="{AAC48540-A596-3C44-A9A0-DE2D1FEA3DF4}"/>
+                  </a:ext>
+                </a:extLst>
+              </p:cNvPr>
+              <p:cNvSpPr txBox="1"/>
+              <p:nvPr/>
+            </p:nvSpPr>
+            <p:spPr>
+              <a:xfrm>
+                <a:off x="931270" y="1821401"/>
+                <a:ext cx="988669" cy="369332"/>
+              </a:xfrm>
+              <a:prstGeom prst="rect">
+                <a:avLst/>
+              </a:prstGeom>
+              <a:noFill/>
+            </p:spPr>
+            <p:txBody>
+              <a:bodyPr wrap="none" rtlCol="0">
+                <a:spAutoFit/>
+              </a:bodyPr>
+              <a:lstStyle/>
+              <a:p>
+                <a14:m>
+                  <m:oMathPara xmlns:m="http://schemas.openxmlformats.org/officeDocument/2006/math">
+                    <m:oMathParaPr>
+                      <m:jc m:val="centerGroup"/>
+                    </m:oMathParaPr>
+                    <m:oMath xmlns:m="http://schemas.openxmlformats.org/officeDocument/2006/math">
+                      <m:sSub>
+                        <m:sSubPr>
+                          <m:ctrlPr>
+                            <a:rPr lang="en-US" b="0" i="1" smtClean="0">
+                              <a:latin typeface="Cambria Math" panose="02040503050406030204" pitchFamily="18" charset="0"/>
+                            </a:rPr>
+                          </m:ctrlPr>
+                        </m:sSubPr>
+                        <m:e>
+                          <m:sSub>
+                            <m:sSubPr>
+                              <m:ctrlPr>
+                                <a:rPr lang="en-US" b="0" i="1" smtClean="0">
+                                  <a:latin typeface="Cambria Math" panose="02040503050406030204" pitchFamily="18" charset="0"/>
+                                </a:rPr>
+                              </m:ctrlPr>
+                            </m:sSubPr>
+                            <m:e>
+                              <m:r>
+                                <a:rPr lang="en-US" b="0" i="1" smtClean="0">
+                                  <a:latin typeface="Cambria Math" panose="02040503050406030204" pitchFamily="18" charset="0"/>
+                                </a:rPr>
+                                <m:t>𝑣</m:t>
+                              </m:r>
+                            </m:e>
+                            <m:sub>
+                              <m:r>
+                                <a:rPr lang="en-US" b="0" i="1" smtClean="0">
+                                  <a:latin typeface="Cambria Math" panose="02040503050406030204" pitchFamily="18" charset="0"/>
+                                </a:rPr>
+                                <m:t>1</m:t>
+                              </m:r>
+                            </m:sub>
+                          </m:sSub>
+                          <m:r>
+                            <a:rPr lang="en-US" b="0" i="1" smtClean="0">
+                              <a:latin typeface="Cambria Math" panose="02040503050406030204" pitchFamily="18" charset="0"/>
+                            </a:rPr>
+                            <m:t>=</m:t>
+                          </m:r>
+                          <m:r>
+                            <a:rPr lang="en-US" b="0" i="1" smtClean="0">
+                              <a:latin typeface="Cambria Math" panose="02040503050406030204" pitchFamily="18" charset="0"/>
+                            </a:rPr>
+                            <m:t>𝑆</m:t>
+                          </m:r>
+                        </m:e>
+                        <m:sub>
+                          <m:r>
+                            <a:rPr lang="en-US" b="0" i="1" smtClean="0">
+                              <a:latin typeface="Cambria Math" panose="02040503050406030204" pitchFamily="18" charset="0"/>
+                            </a:rPr>
+                            <m:t>1</m:t>
+                          </m:r>
+                        </m:sub>
+                      </m:sSub>
+                    </m:oMath>
+                  </m:oMathPara>
+                </a14:m>
+                <a:endParaRPr lang="en-US" dirty="0"/>
+              </a:p>
+            </p:txBody>
+          </p:sp>
+        </mc:Choice>
+        <mc:Fallback>
+          <p:sp>
+            <p:nvSpPr>
+              <p:cNvPr id="11" name="TextBox 10">
+                <a:extLst>
+                  <a:ext uri="{FF2B5EF4-FFF2-40B4-BE49-F238E27FC236}">
+                    <a16:creationId xmlns:a16="http://schemas.microsoft.com/office/drawing/2014/main" id="{AAC48540-A596-3C44-A9A0-DE2D1FEA3DF4}"/>
+                  </a:ext>
+                </a:extLst>
+              </p:cNvPr>
+              <p:cNvSpPr txBox="1">
+                <a:spLocks noRot="1" noChangeAspect="1" noMove="1" noResize="1" noEditPoints="1" noAdjustHandles="1" noChangeArrowheads="1" noChangeShapeType="1" noTextEdit="1"/>
+              </p:cNvSpPr>
+              <p:nvPr/>
+            </p:nvSpPr>
+            <p:spPr>
+              <a:xfrm>
+                <a:off x="931270" y="1821401"/>
+                <a:ext cx="988669" cy="369332"/>
+              </a:xfrm>
+              <a:prstGeom prst="rect">
+                <a:avLst/>
+              </a:prstGeom>
+              <a:blipFill>
+                <a:blip r:embed="rId2"/>
+                <a:stretch>
+                  <a:fillRect/>
+                </a:stretch>
+              </a:blipFill>
+            </p:spPr>
+            <p:txBody>
+              <a:bodyPr/>
+              <a:lstStyle/>
+              <a:p>
+                <a:r>
+                  <a:rPr lang="en-US">
+                    <a:noFill/>
+                  </a:rPr>
+                  <a:t> </a:t>
+                </a:r>
+              </a:p>
+            </p:txBody>
+          </p:sp>
+        </mc:Fallback>
+      </mc:AlternateContent>
+      <mc:AlternateContent xmlns:mc="http://schemas.openxmlformats.org/markup-compatibility/2006">
+        <mc:Choice xmlns:a14="http://schemas.microsoft.com/office/drawing/2010/main" Requires="a14">
+          <p:sp>
+            <p:nvSpPr>
+              <p:cNvPr id="12" name="TextBox 11">
+                <a:extLst>
+                  <a:ext uri="{FF2B5EF4-FFF2-40B4-BE49-F238E27FC236}">
+                    <a16:creationId xmlns:a16="http://schemas.microsoft.com/office/drawing/2014/main" id="{4FAC0373-141B-B444-B1CA-9E46F208FECE}"/>
+                  </a:ext>
+                </a:extLst>
+              </p:cNvPr>
+              <p:cNvSpPr txBox="1"/>
+              <p:nvPr/>
+            </p:nvSpPr>
+            <p:spPr>
+              <a:xfrm>
+                <a:off x="2032696" y="1836477"/>
+                <a:ext cx="1127553" cy="369332"/>
+              </a:xfrm>
+              <a:prstGeom prst="rect">
+                <a:avLst/>
+              </a:prstGeom>
+              <a:noFill/>
+            </p:spPr>
+            <p:txBody>
+              <a:bodyPr wrap="none" rtlCol="0">
+                <a:spAutoFit/>
+              </a:bodyPr>
+              <a:lstStyle/>
+              <a:p>
+                <a14:m>
+                  <m:oMathPara xmlns:m="http://schemas.openxmlformats.org/officeDocument/2006/math">
+                    <m:oMathParaPr>
+                      <m:jc m:val="centerGroup"/>
+                    </m:oMathParaPr>
+                    <m:oMath xmlns:m="http://schemas.openxmlformats.org/officeDocument/2006/math">
+                      <m:sSub>
+                        <m:sSubPr>
+                          <m:ctrlPr>
+                            <a:rPr lang="en-US" b="0" i="1" smtClean="0">
+                              <a:latin typeface="Cambria Math" panose="02040503050406030204" pitchFamily="18" charset="0"/>
+                            </a:rPr>
+                          </m:ctrlPr>
+                        </m:sSubPr>
+                        <m:e>
+                          <m:sSub>
+                            <m:sSubPr>
+                              <m:ctrlPr>
+                                <a:rPr lang="en-US" b="0" i="1" smtClean="0">
+                                  <a:latin typeface="Cambria Math" panose="02040503050406030204" pitchFamily="18" charset="0"/>
+                                </a:rPr>
+                              </m:ctrlPr>
+                            </m:sSubPr>
+                            <m:e>
+                              <m:r>
+                                <a:rPr lang="en-US" b="0" i="1" smtClean="0">
+                                  <a:latin typeface="Cambria Math" panose="02040503050406030204" pitchFamily="18" charset="0"/>
+                                </a:rPr>
+                                <m:t>𝑣</m:t>
+                              </m:r>
+                            </m:e>
+                            <m:sub>
+                              <m:r>
+                                <a:rPr lang="en-US" b="0" i="1" smtClean="0">
+                                  <a:latin typeface="Cambria Math" panose="02040503050406030204" pitchFamily="18" charset="0"/>
+                                </a:rPr>
+                                <m:t>2</m:t>
+                              </m:r>
+                            </m:sub>
+                          </m:sSub>
+                          <m:r>
+                            <a:rPr lang="en-US" b="0" i="1" smtClean="0">
+                              <a:latin typeface="Cambria Math" panose="02040503050406030204" pitchFamily="18" charset="0"/>
+                            </a:rPr>
+                            <m:t>=2</m:t>
+                          </m:r>
+                          <m:r>
+                            <a:rPr lang="en-US" b="0" i="1" smtClean="0">
+                              <a:latin typeface="Cambria Math" panose="02040503050406030204" pitchFamily="18" charset="0"/>
+                            </a:rPr>
+                            <m:t>𝑆</m:t>
+                          </m:r>
+                        </m:e>
+                        <m:sub>
+                          <m:r>
+                            <a:rPr lang="en-US" b="0" i="1" smtClean="0">
+                              <a:latin typeface="Cambria Math" panose="02040503050406030204" pitchFamily="18" charset="0"/>
+                            </a:rPr>
+                            <m:t>2</m:t>
+                          </m:r>
+                        </m:sub>
+                      </m:sSub>
+                    </m:oMath>
+                  </m:oMathPara>
+                </a14:m>
+                <a:endParaRPr lang="en-US" dirty="0"/>
+              </a:p>
+            </p:txBody>
+          </p:sp>
+        </mc:Choice>
+        <mc:Fallback>
+          <p:sp>
+            <p:nvSpPr>
+              <p:cNvPr id="12" name="TextBox 11">
+                <a:extLst>
+                  <a:ext uri="{FF2B5EF4-FFF2-40B4-BE49-F238E27FC236}">
+                    <a16:creationId xmlns:a16="http://schemas.microsoft.com/office/drawing/2014/main" id="{4FAC0373-141B-B444-B1CA-9E46F208FECE}"/>
+                  </a:ext>
+                </a:extLst>
+              </p:cNvPr>
+              <p:cNvSpPr txBox="1">
+                <a:spLocks noRot="1" noChangeAspect="1" noMove="1" noResize="1" noEditPoints="1" noAdjustHandles="1" noChangeArrowheads="1" noChangeShapeType="1" noTextEdit="1"/>
+              </p:cNvSpPr>
+              <p:nvPr/>
+            </p:nvSpPr>
+            <p:spPr>
+              <a:xfrm>
+                <a:off x="2032696" y="1836477"/>
+                <a:ext cx="1127553" cy="369332"/>
+              </a:xfrm>
+              <a:prstGeom prst="rect">
+                <a:avLst/>
+              </a:prstGeom>
+              <a:blipFill>
+                <a:blip r:embed="rId3"/>
+                <a:stretch>
+                  <a:fillRect b="-3333"/>
+                </a:stretch>
+              </a:blipFill>
+            </p:spPr>
+            <p:txBody>
+              <a:bodyPr/>
+              <a:lstStyle/>
+              <a:p>
+                <a:r>
+                  <a:rPr lang="en-US">
+                    <a:noFill/>
+                  </a:rPr>
+                  <a:t> </a:t>
+                </a:r>
+              </a:p>
+            </p:txBody>
+          </p:sp>
+        </mc:Fallback>
+      </mc:AlternateContent>
+      <mc:AlternateContent xmlns:mc="http://schemas.openxmlformats.org/markup-compatibility/2006">
+        <mc:Choice xmlns:a14="http://schemas.microsoft.com/office/drawing/2010/main" Requires="a14">
+          <p:sp>
+            <p:nvSpPr>
+              <p:cNvPr id="13" name="TextBox 12">
+                <a:extLst>
+                  <a:ext uri="{FF2B5EF4-FFF2-40B4-BE49-F238E27FC236}">
+                    <a16:creationId xmlns:a16="http://schemas.microsoft.com/office/drawing/2014/main" id="{D2F51353-4931-FD4A-AAD5-4B93057F4C3C}"/>
+                  </a:ext>
+                </a:extLst>
+              </p:cNvPr>
+              <p:cNvSpPr txBox="1"/>
+              <p:nvPr/>
+            </p:nvSpPr>
+            <p:spPr>
+              <a:xfrm>
+                <a:off x="3799643" y="996157"/>
+                <a:ext cx="1680717" cy="1508875"/>
+              </a:xfrm>
+              <a:prstGeom prst="rect">
+                <a:avLst/>
+              </a:prstGeom>
+              <a:noFill/>
+            </p:spPr>
+            <p:txBody>
+              <a:bodyPr wrap="none" rtlCol="0">
+                <a:spAutoFit/>
+              </a:bodyPr>
+              <a:lstStyle/>
+              <a:p>
+                <a14:m>
+                  <m:oMathPara xmlns:m="http://schemas.openxmlformats.org/officeDocument/2006/math">
+                    <m:oMathParaPr>
+                      <m:jc m:val="centerGroup"/>
+                    </m:oMathParaPr>
+                    <m:oMath xmlns:m="http://schemas.openxmlformats.org/officeDocument/2006/math">
+                      <m:sSub>
+                        <m:sSubPr>
+                          <m:ctrlPr>
+                            <a:rPr lang="en-US" b="0" i="1" smtClean="0">
+                              <a:latin typeface="Cambria Math" panose="02040503050406030204" pitchFamily="18" charset="0"/>
+                            </a:rPr>
+                          </m:ctrlPr>
+                        </m:sSubPr>
+                        <m:e>
+                          <m:acc>
+                            <m:accPr>
+                              <m:chr m:val="̇"/>
+                              <m:ctrlPr>
+                                <a:rPr lang="en-US" b="0" i="1" smtClean="0">
+                                  <a:latin typeface="Cambria Math" panose="02040503050406030204" pitchFamily="18" charset="0"/>
+                                </a:rPr>
+                              </m:ctrlPr>
+                            </m:accPr>
+                            <m:e>
+                              <m:r>
+                                <a:rPr lang="en-US" b="0" i="1" smtClean="0">
+                                  <a:latin typeface="Cambria Math" panose="02040503050406030204" pitchFamily="18" charset="0"/>
+                                </a:rPr>
+                                <m:t>𝑆</m:t>
+                              </m:r>
+                            </m:e>
+                          </m:acc>
+                        </m:e>
+                        <m:sub>
+                          <m:r>
+                            <a:rPr lang="en-US" b="0" i="1" smtClean="0">
+                              <a:latin typeface="Cambria Math" panose="02040503050406030204" pitchFamily="18" charset="0"/>
+                            </a:rPr>
+                            <m:t>1</m:t>
+                          </m:r>
+                        </m:sub>
+                      </m:sSub>
+                      <m:r>
+                        <a:rPr lang="en-US" b="0" i="1" smtClean="0">
+                          <a:latin typeface="Cambria Math" panose="02040503050406030204" pitchFamily="18" charset="0"/>
+                        </a:rPr>
+                        <m:t>=−</m:t>
+                      </m:r>
+                      <m:sSub>
+                        <m:sSubPr>
+                          <m:ctrlPr>
+                            <a:rPr lang="en-US" b="0" i="1" smtClean="0">
+                              <a:latin typeface="Cambria Math" panose="02040503050406030204" pitchFamily="18" charset="0"/>
+                            </a:rPr>
+                          </m:ctrlPr>
+                        </m:sSubPr>
+                        <m:e>
+                          <m:r>
+                            <a:rPr lang="en-US" b="0" i="1" smtClean="0">
+                              <a:latin typeface="Cambria Math" panose="02040503050406030204" pitchFamily="18" charset="0"/>
+                            </a:rPr>
+                            <m:t>𝑆</m:t>
+                          </m:r>
+                        </m:e>
+                        <m:sub>
+                          <m:r>
+                            <a:rPr lang="en-US" b="0" i="1" smtClean="0">
+                              <a:latin typeface="Cambria Math" panose="02040503050406030204" pitchFamily="18" charset="0"/>
+                            </a:rPr>
+                            <m:t>1</m:t>
+                          </m:r>
+                        </m:sub>
+                      </m:sSub>
+                    </m:oMath>
+                  </m:oMathPara>
+                </a14:m>
+                <a:endParaRPr lang="en-US" b="0" dirty="0"/>
+              </a:p>
+              <a:p>
+                <a14:m>
+                  <m:oMathPara xmlns:m="http://schemas.openxmlformats.org/officeDocument/2006/math">
+                    <m:oMathParaPr>
+                      <m:jc m:val="centerGroup"/>
+                    </m:oMathParaPr>
+                    <m:oMath xmlns:m="http://schemas.openxmlformats.org/officeDocument/2006/math">
+                      <m:sSub>
+                        <m:sSubPr>
+                          <m:ctrlPr>
+                            <a:rPr lang="en-US" i="1">
+                              <a:latin typeface="Cambria Math" panose="02040503050406030204" pitchFamily="18" charset="0"/>
+                            </a:rPr>
+                          </m:ctrlPr>
+                        </m:sSubPr>
+                        <m:e>
+                          <m:acc>
+                            <m:accPr>
+                              <m:chr m:val="̇"/>
+                              <m:ctrlPr>
+                                <a:rPr lang="en-US" i="1">
+                                  <a:latin typeface="Cambria Math" panose="02040503050406030204" pitchFamily="18" charset="0"/>
+                                </a:rPr>
+                              </m:ctrlPr>
+                            </m:accPr>
+                            <m:e>
+                              <m:r>
+                                <a:rPr lang="en-US" i="1">
+                                  <a:latin typeface="Cambria Math" panose="02040503050406030204" pitchFamily="18" charset="0"/>
+                                </a:rPr>
+                                <m:t>𝑆</m:t>
+                              </m:r>
+                            </m:e>
+                          </m:acc>
+                        </m:e>
+                        <m:sub>
+                          <m:r>
+                            <a:rPr lang="en-US" b="0" i="1" smtClean="0">
+                              <a:latin typeface="Cambria Math" panose="02040503050406030204" pitchFamily="18" charset="0"/>
+                            </a:rPr>
+                            <m:t>2</m:t>
+                          </m:r>
+                        </m:sub>
+                      </m:sSub>
+                      <m:r>
+                        <a:rPr lang="en-US" i="1">
+                          <a:latin typeface="Cambria Math" panose="02040503050406030204" pitchFamily="18" charset="0"/>
+                        </a:rPr>
+                        <m:t>=</m:t>
+                      </m:r>
+                      <m:sSub>
+                        <m:sSubPr>
+                          <m:ctrlPr>
+                            <a:rPr lang="en-US" i="1">
+                              <a:latin typeface="Cambria Math" panose="02040503050406030204" pitchFamily="18" charset="0"/>
+                            </a:rPr>
+                          </m:ctrlPr>
+                        </m:sSubPr>
+                        <m:e>
+                          <m:r>
+                            <a:rPr lang="en-US" i="1">
+                              <a:latin typeface="Cambria Math" panose="02040503050406030204" pitchFamily="18" charset="0"/>
+                            </a:rPr>
+                            <m:t>𝑆</m:t>
+                          </m:r>
+                        </m:e>
+                        <m:sub>
+                          <m:r>
+                            <a:rPr lang="en-US" i="1">
+                              <a:latin typeface="Cambria Math" panose="02040503050406030204" pitchFamily="18" charset="0"/>
+                            </a:rPr>
+                            <m:t>1</m:t>
+                          </m:r>
+                        </m:sub>
+                      </m:sSub>
+                      <m:r>
+                        <a:rPr lang="en-US" b="0" i="1" smtClean="0">
+                          <a:latin typeface="Cambria Math" panose="02040503050406030204" pitchFamily="18" charset="0"/>
+                        </a:rPr>
+                        <m:t>−2</m:t>
+                      </m:r>
+                      <m:sSub>
+                        <m:sSubPr>
+                          <m:ctrlPr>
+                            <a:rPr lang="en-US" b="0" i="1" smtClean="0">
+                              <a:latin typeface="Cambria Math" panose="02040503050406030204" pitchFamily="18" charset="0"/>
+                            </a:rPr>
+                          </m:ctrlPr>
+                        </m:sSubPr>
+                        <m:e>
+                          <m:r>
+                            <a:rPr lang="en-US" b="0" i="1" smtClean="0">
+                              <a:latin typeface="Cambria Math" panose="02040503050406030204" pitchFamily="18" charset="0"/>
+                            </a:rPr>
+                            <m:t>𝑆</m:t>
+                          </m:r>
+                        </m:e>
+                        <m:sub>
+                          <m:r>
+                            <a:rPr lang="en-US" b="0" i="1" smtClean="0">
+                              <a:latin typeface="Cambria Math" panose="02040503050406030204" pitchFamily="18" charset="0"/>
+                            </a:rPr>
+                            <m:t>2</m:t>
+                          </m:r>
+                        </m:sub>
+                      </m:sSub>
+                    </m:oMath>
+                  </m:oMathPara>
+                </a14:m>
+                <a:endParaRPr lang="en-US" b="0" dirty="0"/>
+              </a:p>
+              <a:p>
+                <a14:m>
+                  <m:oMathPara xmlns:m="http://schemas.openxmlformats.org/officeDocument/2006/math">
+                    <m:oMathParaPr>
+                      <m:jc m:val="centerGroup"/>
+                    </m:oMathParaPr>
+                    <m:oMath xmlns:m="http://schemas.openxmlformats.org/officeDocument/2006/math">
+                      <m:sSub>
+                        <m:sSubPr>
+                          <m:ctrlPr>
+                            <a:rPr lang="en-US" i="1">
+                              <a:latin typeface="Cambria Math" panose="02040503050406030204" pitchFamily="18" charset="0"/>
+                            </a:rPr>
+                          </m:ctrlPr>
+                        </m:sSubPr>
+                        <m:e>
+                          <m:acc>
+                            <m:accPr>
+                              <m:chr m:val="̇"/>
+                              <m:ctrlPr>
+                                <a:rPr lang="en-US" i="1">
+                                  <a:latin typeface="Cambria Math" panose="02040503050406030204" pitchFamily="18" charset="0"/>
+                                </a:rPr>
+                              </m:ctrlPr>
+                            </m:accPr>
+                            <m:e>
+                              <m:r>
+                                <a:rPr lang="en-US" i="1">
+                                  <a:latin typeface="Cambria Math" panose="02040503050406030204" pitchFamily="18" charset="0"/>
+                                </a:rPr>
+                                <m:t>𝑆</m:t>
+                              </m:r>
+                            </m:e>
+                          </m:acc>
+                        </m:e>
+                        <m:sub>
+                          <m:r>
+                            <a:rPr lang="en-US" b="0" i="1" smtClean="0">
+                              <a:latin typeface="Cambria Math" panose="02040503050406030204" pitchFamily="18" charset="0"/>
+                            </a:rPr>
+                            <m:t>3</m:t>
+                          </m:r>
+                        </m:sub>
+                      </m:sSub>
+                      <m:r>
+                        <a:rPr lang="en-US" i="1">
+                          <a:latin typeface="Cambria Math" panose="02040503050406030204" pitchFamily="18" charset="0"/>
+                        </a:rPr>
+                        <m:t>=</m:t>
+                      </m:r>
+                      <m:r>
+                        <a:rPr lang="en-US" b="0" i="1" smtClean="0">
+                          <a:latin typeface="Cambria Math" panose="02040503050406030204" pitchFamily="18" charset="0"/>
+                        </a:rPr>
+                        <m:t>2</m:t>
+                      </m:r>
+                      <m:sSub>
+                        <m:sSubPr>
+                          <m:ctrlPr>
+                            <a:rPr lang="en-US" b="0" i="1" smtClean="0">
+                              <a:latin typeface="Cambria Math" panose="02040503050406030204" pitchFamily="18" charset="0"/>
+                            </a:rPr>
+                          </m:ctrlPr>
+                        </m:sSubPr>
+                        <m:e>
+                          <m:r>
+                            <a:rPr lang="en-US" b="0" i="1" smtClean="0">
+                              <a:latin typeface="Cambria Math" panose="02040503050406030204" pitchFamily="18" charset="0"/>
+                            </a:rPr>
+                            <m:t>𝑆</m:t>
+                          </m:r>
+                        </m:e>
+                        <m:sub>
+                          <m:r>
+                            <a:rPr lang="en-US" b="0" i="1" smtClean="0">
+                              <a:latin typeface="Cambria Math" panose="02040503050406030204" pitchFamily="18" charset="0"/>
+                            </a:rPr>
+                            <m:t>2</m:t>
+                          </m:r>
+                        </m:sub>
+                      </m:sSub>
+                    </m:oMath>
+                  </m:oMathPara>
+                </a14:m>
+                <a:endParaRPr lang="en-US" dirty="0"/>
+              </a:p>
+              <a:p>
+                <a:endParaRPr lang="en-US" dirty="0"/>
+              </a:p>
+              <a:p>
+                <a14:m>
+                  <m:oMathPara xmlns:m="http://schemas.openxmlformats.org/officeDocument/2006/math">
+                    <m:oMathParaPr>
+                      <m:jc m:val="centerGroup"/>
+                    </m:oMathParaPr>
+                    <m:oMath xmlns:m="http://schemas.openxmlformats.org/officeDocument/2006/math">
+                      <m:sSub>
+                        <m:sSubPr>
+                          <m:ctrlPr>
+                            <a:rPr lang="en-US" i="1">
+                              <a:latin typeface="Cambria Math" panose="02040503050406030204" pitchFamily="18" charset="0"/>
+                            </a:rPr>
+                          </m:ctrlPr>
+                        </m:sSubPr>
+                        <m:e>
+                          <m:r>
+                            <a:rPr lang="en-US" i="1">
+                              <a:latin typeface="Cambria Math" panose="02040503050406030204" pitchFamily="18" charset="0"/>
+                            </a:rPr>
+                            <m:t>𝑆</m:t>
+                          </m:r>
+                        </m:e>
+                        <m:sub>
+                          <m:r>
+                            <a:rPr lang="en-US" i="1">
+                              <a:latin typeface="Cambria Math" panose="02040503050406030204" pitchFamily="18" charset="0"/>
+                            </a:rPr>
+                            <m:t>1</m:t>
+                          </m:r>
+                        </m:sub>
+                      </m:sSub>
+                      <m:d>
+                        <m:dPr>
+                          <m:ctrlPr>
+                            <a:rPr lang="en-US" b="0" i="1" smtClean="0">
+                              <a:latin typeface="Cambria Math" panose="02040503050406030204" pitchFamily="18" charset="0"/>
+                            </a:rPr>
+                          </m:ctrlPr>
+                        </m:dPr>
+                        <m:e>
+                          <m:r>
+                            <a:rPr lang="en-US" b="0" i="1" smtClean="0">
+                              <a:latin typeface="Cambria Math" panose="02040503050406030204" pitchFamily="18" charset="0"/>
+                            </a:rPr>
+                            <m:t>0</m:t>
+                          </m:r>
+                        </m:e>
+                      </m:d>
+                      <m:r>
+                        <a:rPr lang="en-US" b="0" i="1" smtClean="0">
+                          <a:latin typeface="Cambria Math" panose="02040503050406030204" pitchFamily="18" charset="0"/>
+                        </a:rPr>
+                        <m:t>=10</m:t>
+                      </m:r>
+                    </m:oMath>
+                  </m:oMathPara>
+                </a14:m>
+                <a:endParaRPr lang="en-US" dirty="0"/>
+              </a:p>
+            </p:txBody>
+          </p:sp>
+        </mc:Choice>
+        <mc:Fallback>
+          <p:sp>
+            <p:nvSpPr>
+              <p:cNvPr id="13" name="TextBox 12">
+                <a:extLst>
+                  <a:ext uri="{FF2B5EF4-FFF2-40B4-BE49-F238E27FC236}">
+                    <a16:creationId xmlns:a16="http://schemas.microsoft.com/office/drawing/2014/main" id="{D2F51353-4931-FD4A-AAD5-4B93057F4C3C}"/>
+                  </a:ext>
+                </a:extLst>
+              </p:cNvPr>
+              <p:cNvSpPr txBox="1">
+                <a:spLocks noRot="1" noChangeAspect="1" noMove="1" noResize="1" noEditPoints="1" noAdjustHandles="1" noChangeArrowheads="1" noChangeShapeType="1" noTextEdit="1"/>
+              </p:cNvSpPr>
+              <p:nvPr/>
+            </p:nvSpPr>
+            <p:spPr>
+              <a:xfrm>
+                <a:off x="3799643" y="996157"/>
+                <a:ext cx="1680717" cy="1508875"/>
+              </a:xfrm>
+              <a:prstGeom prst="rect">
+                <a:avLst/>
+              </a:prstGeom>
+              <a:blipFill>
+                <a:blip r:embed="rId4"/>
+                <a:stretch>
+                  <a:fillRect/>
+                </a:stretch>
+              </a:blipFill>
+            </p:spPr>
+            <p:txBody>
+              <a:bodyPr/>
+              <a:lstStyle/>
+              <a:p>
+                <a:r>
+                  <a:rPr lang="en-US">
+                    <a:noFill/>
+                  </a:rPr>
+                  <a:t> </a:t>
+                </a:r>
+              </a:p>
+            </p:txBody>
+          </p:sp>
+        </mc:Fallback>
+      </mc:AlternateContent>
+      <p:pic>
+        <p:nvPicPr>
+          <p:cNvPr id="15" name="Picture 14" descr="Chart&#10;&#10;Description automatically generated with medium confidence">
+            <a:extLst>
+              <a:ext uri="{FF2B5EF4-FFF2-40B4-BE49-F238E27FC236}">
+                <a16:creationId xmlns:a16="http://schemas.microsoft.com/office/drawing/2014/main" id="{DB667600-ACA1-1C49-AACF-4525987990BA}"/>
+              </a:ext>
+            </a:extLst>
+          </p:cNvPr>
+          <p:cNvPicPr>
+            <a:picLocks noChangeAspect="1"/>
+          </p:cNvPicPr>
+          <p:nvPr/>
+        </p:nvPicPr>
+        <p:blipFill>
+          <a:blip r:embed="rId5"/>
+          <a:stretch>
+            <a:fillRect/>
+          </a:stretch>
+        </p:blipFill>
+        <p:spPr>
+          <a:xfrm>
+            <a:off x="5776707" y="1004099"/>
+            <a:ext cx="2910093" cy="1956787"/>
+          </a:xfrm>
+          <a:prstGeom prst="rect">
+            <a:avLst/>
+          </a:prstGeom>
+        </p:spPr>
+      </p:pic>
+      <p:pic>
+        <p:nvPicPr>
+          <p:cNvPr id="17" name="Picture 16" descr="Chart, line chart&#10;&#10;Description automatically generated">
+            <a:extLst>
+              <a:ext uri="{FF2B5EF4-FFF2-40B4-BE49-F238E27FC236}">
+                <a16:creationId xmlns:a16="http://schemas.microsoft.com/office/drawing/2014/main" id="{2604A6BC-B5E6-D64F-A8B7-728CFB27F023}"/>
+              </a:ext>
+            </a:extLst>
+          </p:cNvPr>
+          <p:cNvPicPr>
+            <a:picLocks noChangeAspect="1"/>
+          </p:cNvPicPr>
+          <p:nvPr/>
+        </p:nvPicPr>
+        <p:blipFill>
+          <a:blip r:embed="rId6"/>
+          <a:stretch>
+            <a:fillRect/>
+          </a:stretch>
+        </p:blipFill>
+        <p:spPr>
+          <a:xfrm>
+            <a:off x="3396050" y="3870482"/>
+            <a:ext cx="5410115" cy="2081256"/>
+          </a:xfrm>
+          <a:prstGeom prst="rect">
+            <a:avLst/>
+          </a:prstGeom>
+        </p:spPr>
+      </p:pic>
+      <p:pic>
+        <p:nvPicPr>
+          <p:cNvPr id="21" name="Picture 20" descr="Table&#10;&#10;Description automatically generated">
+            <a:extLst>
+              <a:ext uri="{FF2B5EF4-FFF2-40B4-BE49-F238E27FC236}">
+                <a16:creationId xmlns:a16="http://schemas.microsoft.com/office/drawing/2014/main" id="{BAC0C5F0-65C6-E747-9065-153F4F8F5EA1}"/>
+              </a:ext>
+            </a:extLst>
+          </p:cNvPr>
+          <p:cNvPicPr>
+            <a:picLocks noChangeAspect="1"/>
+          </p:cNvPicPr>
+          <p:nvPr/>
+        </p:nvPicPr>
+        <p:blipFill>
+          <a:blip r:embed="rId7"/>
+          <a:stretch>
+            <a:fillRect/>
+          </a:stretch>
+        </p:blipFill>
+        <p:spPr>
+          <a:xfrm>
+            <a:off x="332912" y="4201546"/>
+            <a:ext cx="2755900" cy="1562100"/>
+          </a:xfrm>
+          <a:prstGeom prst="rect">
+            <a:avLst/>
+          </a:prstGeom>
+        </p:spPr>
+      </p:pic>
+      <p:sp>
+        <p:nvSpPr>
+          <p:cNvPr id="22" name="TextBox 21">
+            <a:extLst>
+              <a:ext uri="{FF2B5EF4-FFF2-40B4-BE49-F238E27FC236}">
+                <a16:creationId xmlns:a16="http://schemas.microsoft.com/office/drawing/2014/main" id="{F0C6FF66-8942-364D-8775-4C19CE0D9CF7}"/>
+              </a:ext>
+            </a:extLst>
+          </p:cNvPr>
+          <p:cNvSpPr txBox="1"/>
+          <p:nvPr/>
+        </p:nvSpPr>
+        <p:spPr>
+          <a:xfrm>
+            <a:off x="248570" y="3889948"/>
+            <a:ext cx="3034805" cy="338554"/>
+          </a:xfrm>
+          <a:prstGeom prst="rect">
+            <a:avLst/>
+          </a:prstGeom>
+          <a:noFill/>
+        </p:spPr>
+        <p:txBody>
+          <a:bodyPr wrap="none" rtlCol="0">
+            <a:spAutoFit/>
+          </a:bodyPr>
+          <a:lstStyle/>
+          <a:p>
+            <a:r>
+              <a:rPr lang="en-US" sz="1600" b="1" dirty="0"/>
+              <a:t>Eigenvectors for eigenvalues</a:t>
+            </a:r>
+          </a:p>
+        </p:txBody>
+      </p:sp>
+      <p:sp>
+        <p:nvSpPr>
+          <p:cNvPr id="23" name="TextBox 22">
+            <a:extLst>
+              <a:ext uri="{FF2B5EF4-FFF2-40B4-BE49-F238E27FC236}">
+                <a16:creationId xmlns:a16="http://schemas.microsoft.com/office/drawing/2014/main" id="{E7B59058-67E4-E94A-B27C-AF1E7ECB40B1}"/>
+              </a:ext>
+            </a:extLst>
+          </p:cNvPr>
+          <p:cNvSpPr txBox="1"/>
+          <p:nvPr/>
+        </p:nvSpPr>
+        <p:spPr>
+          <a:xfrm>
+            <a:off x="3799643" y="6027939"/>
+            <a:ext cx="3555782" cy="307777"/>
+          </a:xfrm>
+          <a:prstGeom prst="rect">
+            <a:avLst/>
+          </a:prstGeom>
+          <a:noFill/>
+        </p:spPr>
+        <p:txBody>
+          <a:bodyPr wrap="none" rtlCol="0">
+            <a:spAutoFit/>
+          </a:bodyPr>
+          <a:lstStyle/>
+          <a:p>
+            <a:r>
+              <a:rPr lang="en-US" sz="1400" dirty="0"/>
+              <a:t>(Lines are “fuzzified” so can see overlaps.)</a:t>
+            </a:r>
+          </a:p>
+        </p:txBody>
+      </p:sp>
+      <mc:AlternateContent xmlns:mc="http://schemas.openxmlformats.org/markup-compatibility/2006">
+        <mc:Choice xmlns:a14="http://schemas.microsoft.com/office/drawing/2010/main" Requires="a14">
+          <p:sp>
+            <p:nvSpPr>
+              <p:cNvPr id="24" name="Rectangle 23">
+                <a:extLst>
+                  <a:ext uri="{FF2B5EF4-FFF2-40B4-BE49-F238E27FC236}">
+                    <a16:creationId xmlns:a16="http://schemas.microsoft.com/office/drawing/2014/main" id="{251EDAF9-3B1F-E84A-82ED-A1A8C853197E}"/>
+                  </a:ext>
+                </a:extLst>
+              </p:cNvPr>
+              <p:cNvSpPr/>
+              <p:nvPr/>
+            </p:nvSpPr>
+            <p:spPr>
+              <a:xfrm>
+                <a:off x="564554" y="2879432"/>
+                <a:ext cx="2292615" cy="764505"/>
+              </a:xfrm>
+              <a:prstGeom prst="rect">
+                <a:avLst/>
+              </a:prstGeom>
+            </p:spPr>
+            <p:txBody>
+              <a:bodyPr wrap="none">
+                <a:spAutoFit/>
+              </a:bodyPr>
+              <a:lstStyle/>
+              <a:p>
+                <a14:m>
+                  <m:oMathPara xmlns:m="http://schemas.openxmlformats.org/officeDocument/2006/math">
+                    <m:oMathParaPr>
+                      <m:jc m:val="centerGroup"/>
+                    </m:oMathParaPr>
+                    <m:oMath xmlns:m="http://schemas.openxmlformats.org/officeDocument/2006/math">
+                      <m:r>
+                        <a:rPr lang="en-US" b="1" i="1">
+                          <a:latin typeface="Cambria Math" panose="02040503050406030204" pitchFamily="18" charset="0"/>
+                        </a:rPr>
+                        <m:t>𝒙</m:t>
+                      </m:r>
+                      <m:d>
+                        <m:dPr>
+                          <m:ctrlPr>
+                            <a:rPr lang="en-US" i="1">
+                              <a:latin typeface="Cambria Math" panose="02040503050406030204" pitchFamily="18" charset="0"/>
+                            </a:rPr>
+                          </m:ctrlPr>
+                        </m:dPr>
+                        <m:e>
+                          <m:r>
+                            <a:rPr lang="en-US" i="1">
+                              <a:latin typeface="Cambria Math" panose="02040503050406030204" pitchFamily="18" charset="0"/>
+                            </a:rPr>
+                            <m:t>𝑡</m:t>
+                          </m:r>
+                        </m:e>
+                      </m:d>
+                      <m:r>
+                        <a:rPr lang="en-US" i="1">
+                          <a:latin typeface="Cambria Math" panose="02040503050406030204" pitchFamily="18" charset="0"/>
+                        </a:rPr>
+                        <m:t>=</m:t>
+                      </m:r>
+                      <m:nary>
+                        <m:naryPr>
+                          <m:chr m:val="∑"/>
+                          <m:supHide m:val="on"/>
+                          <m:ctrlPr>
+                            <a:rPr lang="en-US" i="1">
+                              <a:latin typeface="Cambria Math" panose="02040503050406030204" pitchFamily="18" charset="0"/>
+                            </a:rPr>
+                          </m:ctrlPr>
+                        </m:naryPr>
+                        <m:sub>
+                          <m:r>
+                            <a:rPr lang="en-US" i="1">
+                              <a:latin typeface="Cambria Math" panose="02040503050406030204" pitchFamily="18" charset="0"/>
+                            </a:rPr>
+                            <m:t>𝑛</m:t>
+                          </m:r>
+                          <m:r>
+                            <a:rPr lang="en-US" i="1">
+                              <a:latin typeface="Cambria Math" panose="02040503050406030204" pitchFamily="18" charset="0"/>
+                            </a:rPr>
+                            <m:t>=1 </m:t>
+                          </m:r>
+                        </m:sub>
+                        <m:sup/>
+                        <m:e>
+                          <m:sSub>
+                            <m:sSubPr>
+                              <m:ctrlPr>
+                                <a:rPr lang="en-US" i="1">
+                                  <a:latin typeface="Cambria Math" panose="02040503050406030204" pitchFamily="18" charset="0"/>
+                                </a:rPr>
+                              </m:ctrlPr>
+                            </m:sSubPr>
+                            <m:e>
+                              <m:r>
+                                <a:rPr lang="en-US" i="1">
+                                  <a:latin typeface="Cambria Math" panose="02040503050406030204" pitchFamily="18" charset="0"/>
+                                </a:rPr>
+                                <m:t>𝑐</m:t>
+                              </m:r>
+                            </m:e>
+                            <m:sub>
+                              <m:r>
+                                <a:rPr lang="en-US" i="1">
+                                  <a:latin typeface="Cambria Math" panose="02040503050406030204" pitchFamily="18" charset="0"/>
+                                </a:rPr>
+                                <m:t>𝑛</m:t>
+                              </m:r>
+                            </m:sub>
+                          </m:sSub>
+                          <m:sSub>
+                            <m:sSubPr>
+                              <m:ctrlPr>
+                                <a:rPr lang="en-US" i="1">
+                                  <a:latin typeface="Cambria Math" panose="02040503050406030204" pitchFamily="18" charset="0"/>
+                                </a:rPr>
+                              </m:ctrlPr>
+                            </m:sSubPr>
+                            <m:e>
+                              <m:r>
+                                <a:rPr lang="en-US" b="1" i="1">
+                                  <a:latin typeface="Cambria Math" panose="02040503050406030204" pitchFamily="18" charset="0"/>
+                                </a:rPr>
+                                <m:t>𝒖</m:t>
+                              </m:r>
+                            </m:e>
+                            <m:sub>
+                              <m:r>
+                                <a:rPr lang="en-US" i="1">
+                                  <a:latin typeface="Cambria Math" panose="02040503050406030204" pitchFamily="18" charset="0"/>
+                                </a:rPr>
+                                <m:t>𝑛</m:t>
+                              </m:r>
+                            </m:sub>
+                          </m:sSub>
+                          <m:sSup>
+                            <m:sSupPr>
+                              <m:ctrlPr>
+                                <a:rPr lang="en-US" i="1">
+                                  <a:latin typeface="Cambria Math" panose="02040503050406030204" pitchFamily="18" charset="0"/>
+                                </a:rPr>
+                              </m:ctrlPr>
+                            </m:sSupPr>
+                            <m:e>
+                              <m:r>
+                                <a:rPr lang="en-US" i="1">
+                                  <a:latin typeface="Cambria Math" panose="02040503050406030204" pitchFamily="18" charset="0"/>
+                                </a:rPr>
+                                <m:t>𝑒</m:t>
+                              </m:r>
+                            </m:e>
+                            <m:sup>
+                              <m:sSub>
+                                <m:sSubPr>
+                                  <m:ctrlPr>
+                                    <a:rPr lang="en-US" i="1">
+                                      <a:latin typeface="Cambria Math" panose="02040503050406030204" pitchFamily="18" charset="0"/>
+                                    </a:rPr>
+                                  </m:ctrlPr>
+                                </m:sSubPr>
+                                <m:e>
+                                  <m:r>
+                                    <a:rPr lang="en-US" i="1">
+                                      <a:latin typeface="Cambria Math" panose="02040503050406030204" pitchFamily="18" charset="0"/>
+                                    </a:rPr>
+                                    <m:t>𝜆</m:t>
+                                  </m:r>
+                                </m:e>
+                                <m:sub>
+                                  <m:r>
+                                    <a:rPr lang="en-US" i="1">
+                                      <a:latin typeface="Cambria Math" panose="02040503050406030204" pitchFamily="18" charset="0"/>
+                                    </a:rPr>
+                                    <m:t>𝑛</m:t>
+                                  </m:r>
+                                </m:sub>
+                              </m:sSub>
+                              <m:r>
+                                <a:rPr lang="en-US" i="1">
+                                  <a:latin typeface="Cambria Math" panose="02040503050406030204" pitchFamily="18" charset="0"/>
+                                </a:rPr>
+                                <m:t>𝑡</m:t>
+                              </m:r>
+                            </m:sup>
+                          </m:sSup>
+                        </m:e>
+                      </m:nary>
+                    </m:oMath>
+                  </m:oMathPara>
+                </a14:m>
+                <a:endParaRPr lang="en-US" dirty="0"/>
+              </a:p>
+            </p:txBody>
+          </p:sp>
+        </mc:Choice>
+        <mc:Fallback>
+          <p:sp>
+            <p:nvSpPr>
+              <p:cNvPr id="24" name="Rectangle 23">
+                <a:extLst>
+                  <a:ext uri="{FF2B5EF4-FFF2-40B4-BE49-F238E27FC236}">
+                    <a16:creationId xmlns:a16="http://schemas.microsoft.com/office/drawing/2014/main" id="{251EDAF9-3B1F-E84A-82ED-A1A8C853197E}"/>
+                  </a:ext>
+                </a:extLst>
+              </p:cNvPr>
+              <p:cNvSpPr>
+                <a:spLocks noRot="1" noChangeAspect="1" noMove="1" noResize="1" noEditPoints="1" noAdjustHandles="1" noChangeArrowheads="1" noChangeShapeType="1" noTextEdit="1"/>
+              </p:cNvSpPr>
+              <p:nvPr/>
+            </p:nvSpPr>
+            <p:spPr>
+              <a:xfrm>
+                <a:off x="564554" y="2879432"/>
+                <a:ext cx="2292615" cy="764505"/>
+              </a:xfrm>
+              <a:prstGeom prst="rect">
+                <a:avLst/>
+              </a:prstGeom>
+              <a:blipFill>
+                <a:blip r:embed="rId8"/>
+                <a:stretch>
+                  <a:fillRect t="-119355" b="-166129"/>
+                </a:stretch>
+              </a:blipFill>
+            </p:spPr>
+            <p:txBody>
+              <a:bodyPr/>
+              <a:lstStyle/>
+              <a:p>
+                <a:r>
+                  <a:rPr lang="en-US">
+                    <a:noFill/>
+                  </a:rPr>
+                  <a:t> </a:t>
+                </a:r>
+              </a:p>
+            </p:txBody>
+          </p:sp>
+        </mc:Fallback>
+      </mc:AlternateContent>
+      <p:sp>
+        <p:nvSpPr>
+          <p:cNvPr id="25" name="TextBox 24">
+            <a:extLst>
+              <a:ext uri="{FF2B5EF4-FFF2-40B4-BE49-F238E27FC236}">
+                <a16:creationId xmlns:a16="http://schemas.microsoft.com/office/drawing/2014/main" id="{67276F98-2670-6043-B28F-1A17FF681CD5}"/>
+              </a:ext>
+            </a:extLst>
+          </p:cNvPr>
+          <p:cNvSpPr txBox="1"/>
+          <p:nvPr/>
+        </p:nvSpPr>
+        <p:spPr>
+          <a:xfrm>
+            <a:off x="6951216" y="2849732"/>
+            <a:ext cx="498855" cy="261610"/>
+          </a:xfrm>
+          <a:prstGeom prst="rect">
+            <a:avLst/>
+          </a:prstGeom>
+          <a:noFill/>
+        </p:spPr>
+        <p:txBody>
+          <a:bodyPr wrap="none" rtlCol="0">
+            <a:spAutoFit/>
+          </a:bodyPr>
+          <a:lstStyle/>
+          <a:p>
+            <a:r>
+              <a:rPr lang="en-US" sz="1050" dirty="0"/>
+              <a:t>Time</a:t>
+            </a:r>
+          </a:p>
+        </p:txBody>
+      </p:sp>
+    </p:spTree>
+    <p:extLst>
+      <p:ext uri="{BB962C8B-B14F-4D97-AF65-F5344CB8AC3E}">
+        <p14:creationId xmlns:p14="http://schemas.microsoft.com/office/powerpoint/2010/main" val="3452243339"/>
+      </p:ext>
+    </p:extLst>
+  </p:cSld>
+  <p:clrMapOvr>
+    <a:masterClrMapping/>
+  </p:clrMapOvr>
+  <p:timing>
+    <p:tnLst>
+      <p:par>
+        <p:cTn id="1" dur="indefinite" restart="never" nodeType="tmRoot">
+          <p:childTnLst>
+            <p:seq concurrent="1" nextAc="seek">
+              <p:cTn id="2" dur="indefinite" nodeType="mainSeq">
+                <p:childTnLst>
+                  <p:par>
+                    <p:cTn id="3" fill="hold">
+                      <p:stCondLst>
+                        <p:cond delay="indefinite"/>
+                      </p:stCondLst>
+                      <p:childTnLst>
+                        <p:par>
+                          <p:cTn id="4" fill="hold">
+                            <p:stCondLst>
+                              <p:cond delay="0"/>
+                            </p:stCondLst>
+                            <p:childTnLst>
+                              <p:par>
+                                <p:cTn id="5" presetID="1" presetClass="entr" presetSubtype="0" fill="hold" grpId="0" nodeType="clickEffect">
+                                  <p:stCondLst>
+                                    <p:cond delay="0"/>
+                                  </p:stCondLst>
+                                  <p:childTnLst>
+                                    <p:set>
+                                      <p:cBhvr>
+                                        <p:cTn id="6" dur="1" fill="hold">
+                                          <p:stCondLst>
+                                            <p:cond delay="0"/>
+                                          </p:stCondLst>
+                                        </p:cTn>
+                                        <p:tgtEl>
+                                          <p:spTgt spid="13"/>
+                                        </p:tgtEl>
+                                        <p:attrNameLst>
+                                          <p:attrName>style.visibility</p:attrName>
+                                        </p:attrNameLst>
+                                      </p:cBhvr>
+                                      <p:to>
+                                        <p:strVal val="visible"/>
+                                      </p:to>
+                                    </p:set>
+                                  </p:childTnLst>
+                                </p:cTn>
+                              </p:par>
+                            </p:childTnLst>
+                          </p:cTn>
+                        </p:par>
+                      </p:childTnLst>
+                    </p:cTn>
+                  </p:par>
+                  <p:par>
+                    <p:cTn id="7" fill="hold">
+                      <p:stCondLst>
+                        <p:cond delay="indefinite"/>
+                      </p:stCondLst>
+                      <p:childTnLst>
+                        <p:par>
+                          <p:cTn id="8" fill="hold">
+                            <p:stCondLst>
+                              <p:cond delay="0"/>
+                            </p:stCondLst>
+                            <p:childTnLst>
+                              <p:par>
+                                <p:cTn id="9" presetID="1" presetClass="entr" presetSubtype="0" fill="hold" nodeType="clickEffect">
+                                  <p:stCondLst>
+                                    <p:cond delay="0"/>
+                                  </p:stCondLst>
+                                  <p:childTnLst>
+                                    <p:set>
+                                      <p:cBhvr>
+                                        <p:cTn id="10" dur="1" fill="hold">
+                                          <p:stCondLst>
+                                            <p:cond delay="0"/>
+                                          </p:stCondLst>
+                                        </p:cTn>
+                                        <p:tgtEl>
+                                          <p:spTgt spid="15"/>
+                                        </p:tgtEl>
+                                        <p:attrNameLst>
+                                          <p:attrName>style.visibility</p:attrName>
+                                        </p:attrNameLst>
+                                      </p:cBhvr>
+                                      <p:to>
+                                        <p:strVal val="visible"/>
+                                      </p:to>
+                                    </p:set>
+                                  </p:childTnLst>
+                                </p:cTn>
+                              </p:par>
+                              <p:par>
+                                <p:cTn id="11" presetID="1" presetClass="entr" presetSubtype="0" fill="hold" grpId="0" nodeType="withEffect">
+                                  <p:stCondLst>
+                                    <p:cond delay="0"/>
+                                  </p:stCondLst>
+                                  <p:childTnLst>
+                                    <p:set>
+                                      <p:cBhvr>
+                                        <p:cTn id="12" dur="1" fill="hold">
+                                          <p:stCondLst>
+                                            <p:cond delay="0"/>
+                                          </p:stCondLst>
+                                        </p:cTn>
+                                        <p:tgtEl>
+                                          <p:spTgt spid="25"/>
+                                        </p:tgtEl>
+                                        <p:attrNameLst>
+                                          <p:attrName>style.visibility</p:attrName>
+                                        </p:attrNameLst>
+                                      </p:cBhvr>
+                                      <p:to>
+                                        <p:strVal val="visible"/>
+                                      </p:to>
+                                    </p:set>
+                                  </p:childTnLst>
+                                </p:cTn>
+                              </p:par>
+                            </p:childTnLst>
+                          </p:cTn>
+                        </p:par>
+                      </p:childTnLst>
+                    </p:cTn>
+                  </p:par>
+                  <p:par>
+                    <p:cTn id="13" fill="hold">
+                      <p:stCondLst>
+                        <p:cond delay="indefinite"/>
+                      </p:stCondLst>
+                      <p:childTnLst>
+                        <p:par>
+                          <p:cTn id="14" fill="hold">
+                            <p:stCondLst>
+                              <p:cond delay="0"/>
+                            </p:stCondLst>
+                            <p:childTnLst>
+                              <p:par>
+                                <p:cTn id="15" presetID="1" presetClass="entr" presetSubtype="0" fill="hold" grpId="0" nodeType="clickEffect">
+                                  <p:stCondLst>
+                                    <p:cond delay="0"/>
+                                  </p:stCondLst>
+                                  <p:childTnLst>
+                                    <p:set>
+                                      <p:cBhvr>
+                                        <p:cTn id="16" dur="1" fill="hold">
+                                          <p:stCondLst>
+                                            <p:cond delay="0"/>
+                                          </p:stCondLst>
+                                        </p:cTn>
+                                        <p:tgtEl>
+                                          <p:spTgt spid="24"/>
+                                        </p:tgtEl>
+                                        <p:attrNameLst>
+                                          <p:attrName>style.visibility</p:attrName>
+                                        </p:attrNameLst>
+                                      </p:cBhvr>
+                                      <p:to>
+                                        <p:strVal val="visible"/>
+                                      </p:to>
+                                    </p:set>
+                                  </p:childTnLst>
+                                </p:cTn>
+                              </p:par>
+                            </p:childTnLst>
+                          </p:cTn>
+                        </p:par>
+                      </p:childTnLst>
+                    </p:cTn>
+                  </p:par>
+                  <p:par>
+                    <p:cTn id="17" fill="hold">
+                      <p:stCondLst>
+                        <p:cond delay="indefinite"/>
+                      </p:stCondLst>
+                      <p:childTnLst>
+                        <p:par>
+                          <p:cTn id="18" fill="hold">
+                            <p:stCondLst>
+                              <p:cond delay="0"/>
+                            </p:stCondLst>
+                            <p:childTnLst>
+                              <p:par>
+                                <p:cTn id="19" presetID="1" presetClass="entr" presetSubtype="0" fill="hold" nodeType="clickEffect">
+                                  <p:stCondLst>
+                                    <p:cond delay="0"/>
+                                  </p:stCondLst>
+                                  <p:childTnLst>
+                                    <p:set>
+                                      <p:cBhvr>
+                                        <p:cTn id="20" dur="1" fill="hold">
+                                          <p:stCondLst>
+                                            <p:cond delay="0"/>
+                                          </p:stCondLst>
+                                        </p:cTn>
+                                        <p:tgtEl>
+                                          <p:spTgt spid="21"/>
+                                        </p:tgtEl>
+                                        <p:attrNameLst>
+                                          <p:attrName>style.visibility</p:attrName>
+                                        </p:attrNameLst>
+                                      </p:cBhvr>
+                                      <p:to>
+                                        <p:strVal val="visible"/>
+                                      </p:to>
+                                    </p:set>
+                                  </p:childTnLst>
+                                </p:cTn>
+                              </p:par>
+                              <p:par>
+                                <p:cTn id="21" presetID="1" presetClass="entr" presetSubtype="0" fill="hold" grpId="0" nodeType="withEffect">
+                                  <p:stCondLst>
+                                    <p:cond delay="0"/>
+                                  </p:stCondLst>
+                                  <p:childTnLst>
+                                    <p:set>
+                                      <p:cBhvr>
+                                        <p:cTn id="22" dur="1" fill="hold">
+                                          <p:stCondLst>
+                                            <p:cond delay="0"/>
+                                          </p:stCondLst>
+                                        </p:cTn>
+                                        <p:tgtEl>
+                                          <p:spTgt spid="22"/>
+                                        </p:tgtEl>
+                                        <p:attrNameLst>
+                                          <p:attrName>style.visibility</p:attrName>
+                                        </p:attrNameLst>
+                                      </p:cBhvr>
+                                      <p:to>
+                                        <p:strVal val="visible"/>
+                                      </p:to>
+                                    </p:set>
+                                  </p:childTnLst>
+                                </p:cTn>
+                              </p:par>
+                            </p:childTnLst>
+                          </p:cTn>
+                        </p:par>
+                      </p:childTnLst>
+                    </p:cTn>
+                  </p:par>
+                  <p:par>
+                    <p:cTn id="23" fill="hold">
+                      <p:stCondLst>
+                        <p:cond delay="indefinite"/>
+                      </p:stCondLst>
+                      <p:childTnLst>
+                        <p:par>
+                          <p:cTn id="24" fill="hold">
+                            <p:stCondLst>
+                              <p:cond delay="0"/>
+                            </p:stCondLst>
+                            <p:childTnLst>
+                              <p:par>
+                                <p:cTn id="25" presetID="1" presetClass="entr" presetSubtype="0" fill="hold" nodeType="clickEffect">
+                                  <p:stCondLst>
+                                    <p:cond delay="0"/>
+                                  </p:stCondLst>
+                                  <p:childTnLst>
+                                    <p:set>
+                                      <p:cBhvr>
+                                        <p:cTn id="26" dur="1" fill="hold">
+                                          <p:stCondLst>
+                                            <p:cond delay="0"/>
+                                          </p:stCondLst>
+                                        </p:cTn>
+                                        <p:tgtEl>
+                                          <p:spTgt spid="17"/>
+                                        </p:tgtEl>
+                                        <p:attrNameLst>
+                                          <p:attrName>style.visibility</p:attrName>
+                                        </p:attrNameLst>
+                                      </p:cBhvr>
+                                      <p:to>
+                                        <p:strVal val="visible"/>
+                                      </p:to>
+                                    </p:set>
+                                  </p:childTnLst>
+                                </p:cTn>
+                              </p:par>
+                              <p:par>
+                                <p:cTn id="27" presetID="1" presetClass="entr" presetSubtype="0" fill="hold" grpId="0" nodeType="withEffect">
+                                  <p:stCondLst>
+                                    <p:cond delay="0"/>
+                                  </p:stCondLst>
+                                  <p:childTnLst>
+                                    <p:set>
+                                      <p:cBhvr>
+                                        <p:cTn id="28" dur="1" fill="hold">
+                                          <p:stCondLst>
+                                            <p:cond delay="0"/>
+                                          </p:stCondLst>
+                                        </p:cTn>
+                                        <p:tgtEl>
+                                          <p:spTgt spid="23"/>
+                                        </p:tgtEl>
+                                        <p:attrNameLst>
+                                          <p:attrName>style.visibility</p:attrName>
+                                        </p:attrNameLst>
+                                      </p:cBhvr>
+                                      <p:to>
+                                        <p:strVal val="visible"/>
+                                      </p:to>
+                                    </p:set>
+                                  </p:childTnLst>
+                                </p:cTn>
+                              </p:par>
+                            </p:childTnLst>
+                          </p:cTn>
+                        </p:par>
+                      </p:childTnLst>
+                    </p:cTn>
+                  </p:par>
+                </p:childTnLst>
+              </p:cTn>
+              <p:prevCondLst>
+                <p:cond evt="onPrev" delay="0">
+                  <p:tgtEl>
+                    <p:sldTgt/>
+                  </p:tgtEl>
+                </p:cond>
+              </p:prevCondLst>
+              <p:nextCondLst>
+                <p:cond evt="onNext" delay="0">
+                  <p:tgtEl>
+                    <p:sldTgt/>
+                  </p:tgtEl>
+                </p:cond>
+              </p:nextCondLst>
+            </p:seq>
+          </p:childTnLst>
+        </p:cTn>
+      </p:par>
+    </p:tnLst>
+    <p:bldLst>
+      <p:bldP spid="13" grpId="0"/>
+      <p:bldP spid="22" grpId="0"/>
+      <p:bldP spid="23" grpId="0"/>
+      <p:bldP spid="24" grpId="0"/>
+      <p:bldP spid="25" grpId="0"/>
+    </p:bldLst>
+  </p:timing>
+</p:sld>
+</file>
+
+<file path=ppt/slides/slide13.xml><?xml version="1.0" encoding="utf-8"?>
+<p:sld xmlns:a="http://schemas.openxmlformats.org/drawingml/2006/main" xmlns:r="http://schemas.openxmlformats.org/officeDocument/2006/relationships" xmlns:p="http://schemas.openxmlformats.org/presentationml/2006/main">
+  <p:cSld>
+    <p:spTree>
+      <p:nvGrpSpPr>
+        <p:cNvPr id="1" name=""/>
+        <p:cNvGrpSpPr/>
+        <p:nvPr/>
+      </p:nvGrpSpPr>
+      <p:grpSpPr>
+        <a:xfrm>
+          <a:off x="0" y="0"/>
+          <a:ext cx="0" cy="0"/>
+          <a:chOff x="0" y="0"/>
+          <a:chExt cx="0" cy="0"/>
+        </a:xfrm>
+      </p:grpSpPr>
+      <p:sp>
+        <p:nvSpPr>
+          <p:cNvPr id="2" name="Title 1">
+            <a:extLst>
+              <a:ext uri="{FF2B5EF4-FFF2-40B4-BE49-F238E27FC236}">
                 <a16:creationId xmlns:a16="http://schemas.microsoft.com/office/drawing/2014/main" id="{3905BCF8-F96F-A944-9B00-A3A945BBFF3D}"/>
               </a:ext>
             </a:extLst>
@@ -8829,7 +10638,7 @@
               <a:pPr>
                 <a:defRPr/>
               </a:pPr>
-              <a:t>12</a:t>
+              <a:t>13</a:t>
             </a:fld>
             <a:endParaRPr lang="en-US" altLang="x-none"/>
           </a:p>
@@ -9406,7 +11215,7 @@
 </p:sld>
 </file>
 
-<file path=ppt/slides/slide13.xml><?xml version="1.0" encoding="utf-8"?>
+<file path=ppt/slides/slide14.xml><?xml version="1.0" encoding="utf-8"?>
 <p:sld xmlns:a="http://schemas.openxmlformats.org/drawingml/2006/main" xmlns:r="http://schemas.openxmlformats.org/officeDocument/2006/relationships" xmlns:p="http://schemas.openxmlformats.org/presentationml/2006/main">
   <p:cSld>
     <p:spTree>
@@ -9624,7 +11433,7 @@
               <a:pPr>
                 <a:defRPr/>
               </a:pPr>
-              <a:t>13</a:t>
+              <a:t>14</a:t>
             </a:fld>
             <a:endParaRPr lang="en-US" altLang="x-none"/>
           </a:p>
@@ -11375,7 +13184,7 @@
 </p:sld>
 </file>
 
-<file path=ppt/slides/slide14.xml><?xml version="1.0" encoding="utf-8"?>
+<file path=ppt/slides/slide15.xml><?xml version="1.0" encoding="utf-8"?>
 <p:sld xmlns:a="http://schemas.openxmlformats.org/drawingml/2006/main" xmlns:r="http://schemas.openxmlformats.org/officeDocument/2006/relationships" xmlns:p="http://schemas.openxmlformats.org/presentationml/2006/main">
   <p:cSld>
     <p:spTree>
@@ -11454,7 +13263,7 @@
               <a:pPr>
                 <a:defRPr/>
               </a:pPr>
-              <a:t>14</a:t>
+              <a:t>15</a:t>
             </a:fld>
             <a:endParaRPr lang="en-US" altLang="x-none"/>
           </a:p>
@@ -14691,7 +16500,7 @@
 </p:sld>
 </file>
 
-<file path=ppt/slides/slide15.xml><?xml version="1.0" encoding="utf-8"?>
+<file path=ppt/slides/slide16.xml><?xml version="1.0" encoding="utf-8"?>
 <p:sld xmlns:a="http://schemas.openxmlformats.org/drawingml/2006/main" xmlns:r="http://schemas.openxmlformats.org/officeDocument/2006/relationships" xmlns:p="http://schemas.openxmlformats.org/presentationml/2006/main">
   <p:cSld>
     <p:spTree>
@@ -14966,7 +16775,7 @@
               <a:pPr>
                 <a:defRPr/>
               </a:pPr>
-              <a:t>15</a:t>
+              <a:t>16</a:t>
             </a:fld>
             <a:endParaRPr lang="en-US" altLang="x-none"/>
           </a:p>
@@ -14985,7 +16794,7 @@
 </p:sld>
 </file>
 
-<file path=ppt/slides/slide16.xml><?xml version="1.0" encoding="utf-8"?>
+<file path=ppt/slides/slide17.xml><?xml version="1.0" encoding="utf-8"?>
 <p:sld xmlns:a="http://schemas.openxmlformats.org/drawingml/2006/main" xmlns:r="http://schemas.openxmlformats.org/officeDocument/2006/relationships" xmlns:p="http://schemas.openxmlformats.org/presentationml/2006/main">
   <p:cSld>
     <p:spTree>
@@ -15483,7 +17292,7 @@
               <a:pPr>
                 <a:defRPr/>
               </a:pPr>
-              <a:t>16</a:t>
+              <a:t>17</a:t>
             </a:fld>
             <a:endParaRPr lang="en-US" altLang="x-none"/>
           </a:p>
@@ -15502,7 +17311,7 @@
 </p:sld>
 </file>
 
-<file path=ppt/slides/slide17.xml><?xml version="1.0" encoding="utf-8"?>
+<file path=ppt/slides/slide18.xml><?xml version="1.0" encoding="utf-8"?>
 <p:sld xmlns:a="http://schemas.openxmlformats.org/drawingml/2006/main" xmlns:r="http://schemas.openxmlformats.org/officeDocument/2006/relationships" xmlns:p="http://schemas.openxmlformats.org/presentationml/2006/main">
   <p:cSld>
     <p:spTree>
@@ -16280,7 +18089,7 @@
               <a:pPr>
                 <a:defRPr/>
               </a:pPr>
-              <a:t>17</a:t>
+              <a:t>18</a:t>
             </a:fld>
             <a:endParaRPr lang="en-US" altLang="x-none"/>
           </a:p>
@@ -18961,7 +20770,7 @@
 </p:sld>
 </file>
 
-<file path=ppt/slides/slide18.xml><?xml version="1.0" encoding="utf-8"?>
+<file path=ppt/slides/slide19.xml><?xml version="1.0" encoding="utf-8"?>
 <p:sld xmlns:a="http://schemas.openxmlformats.org/drawingml/2006/main" xmlns:r="http://schemas.openxmlformats.org/officeDocument/2006/relationships" xmlns:p="http://schemas.openxmlformats.org/presentationml/2006/main">
   <p:cSld>
     <p:spTree>
@@ -19822,7 +21631,7 @@
               <a:pPr>
                 <a:defRPr/>
               </a:pPr>
-              <a:t>18</a:t>
+              <a:t>19</a:t>
             </a:fld>
             <a:endParaRPr lang="en-US" altLang="x-none" dirty="0"/>
           </a:p>

</xml_diff>